<commit_message>
Added link to code in presentation
</commit_message>
<xml_diff>
--- a/level-up-react/level-up-react.pptx
+++ b/level-up-react/level-up-react.pptx
@@ -13732,7 +13732,7 @@
         <p:spPr>
           <a:xfrm>
             <a:off x="1349445" y="4241688"/>
-            <a:ext cx="8390728" cy="914400"/>
+            <a:ext cx="9067464" cy="914400"/>
           </a:xfrm>
           <a:prstGeom prst="rect">
             <a:avLst/>
@@ -13793,31 +13793,11 @@
               </a:buClr>
             </a:pPr>
             <a:r>
-              <a:rPr lang="da-DK" dirty="0" smtClean="0">
-                <a:hlinkClick r:id="rId2"/>
-              </a:rPr>
-              <a:t>https</a:t>
-            </a:r>
-            <a:r>
               <a:rPr lang="da-DK" dirty="0">
                 <a:hlinkClick r:id="rId2"/>
               </a:rPr>
-              <a:t>://</a:t>
-            </a:r>
-            <a:r>
-              <a:rPr lang="da-DK" dirty="0" smtClean="0">
-                <a:hlinkClick r:id="rId2"/>
-              </a:rPr>
-              <a:t>github.com/lajtmaN/react-meetup-examples/level-up-react</a:t>
-            </a:r>
-            <a:endParaRPr lang="da-DK" dirty="0" smtClean="0"/>
-          </a:p>
-          <a:p>
-            <a:pPr marL="685800" indent="-685800" algn="l" defTabSz="914400" hangingPunct="1">
-              <a:buClr>
-                <a:schemeClr val="tx2"/>
-              </a:buClr>
-            </a:pPr>
+              <a:t>https://github.com/lajtmaN/react-meetup-examples/tree/master/level-up-react</a:t>
+            </a:r>
             <a:endParaRPr kumimoji="0" lang="da-DK" sz="2000" b="0" i="0" u="none" strike="noStrike" cap="none" spc="-79" normalizeH="0" baseline="0" dirty="0" smtClean="0">
               <a:ln>
                 <a:noFill/>

</xml_diff>